<commit_message>
amended ppt template slide masters
</commit_message>
<xml_diff>
--- a/_extensions/DHSC/DHSC-PPT-template.pptx
+++ b/_extensions/DHSC/DHSC-PPT-template.pptx
@@ -208,7 +208,7 @@
           <a:p>
             <a:fld id="{0F9C1CCF-B725-44A7-AA57-5E433BD85C9F}" type="datetimeFigureOut">
               <a:rPr lang="en-US" smtClean="0"/>
-              <a:t>8/16/2023</a:t>
+              <a:t>8/30/2023</a:t>
             </a:fld>
             <a:endParaRPr lang="en-US"/>
           </a:p>
@@ -592,6 +592,9 @@
             <a:off x="697781" y="3117165"/>
             <a:ext cx="6858000" cy="300082"/>
           </a:xfrm>
+          <a:prstGeom prst="rect">
+            <a:avLst/>
+          </a:prstGeom>
         </p:spPr>
         <p:txBody>
           <a:bodyPr>
@@ -684,7 +687,7 @@
             <a:fld id="{241EB5C9-1307-BA42-ABA2-0BC069CD8E7F}" type="datetimeFigureOut">
               <a:rPr lang="en-US" smtClean="0"/>
               <a:pPr/>
-              <a:t>8/16/2023</a:t>
+              <a:t>8/30/2023</a:t>
             </a:fld>
             <a:endParaRPr lang="en-US" dirty="0"/>
           </a:p>
@@ -815,6 +818,9 @@
             <a:off x="3887391" y="740569"/>
             <a:ext cx="4629150" cy="3655219"/>
           </a:xfrm>
+          <a:prstGeom prst="rect">
+            <a:avLst/>
+          </a:prstGeom>
         </p:spPr>
         <p:txBody>
           <a:bodyPr/>
@@ -906,6 +912,9 @@
             <a:off x="629841" y="1543050"/>
             <a:ext cx="2949178" cy="2858691"/>
           </a:xfrm>
+          <a:prstGeom prst="rect">
+            <a:avLst/>
+          </a:prstGeom>
         </p:spPr>
         <p:txBody>
           <a:bodyPr/>
@@ -1157,6 +1166,9 @@
             <a:off x="3887391" y="740569"/>
             <a:ext cx="4629150" cy="3655219"/>
           </a:xfrm>
+          <a:prstGeom prst="rect">
+            <a:avLst/>
+          </a:prstGeom>
         </p:spPr>
         <p:txBody>
           <a:bodyPr/>
@@ -1228,6 +1240,9 @@
             <a:off x="629841" y="1543050"/>
             <a:ext cx="2949178" cy="2858691"/>
           </a:xfrm>
+          <a:prstGeom prst="rect">
+            <a:avLst/>
+          </a:prstGeom>
         </p:spPr>
         <p:txBody>
           <a:bodyPr/>
@@ -1465,45 +1480,60 @@
             <p:ph type="body" orient="vert" idx="1"/>
           </p:nvPr>
         </p:nvSpPr>
-        <p:spPr/>
+        <p:spPr>
+          <a:xfrm>
+            <a:off x="270000" y="1080000"/>
+            <a:ext cx="8583055" cy="3263504"/>
+          </a:xfrm>
+          <a:prstGeom prst="rect">
+            <a:avLst/>
+          </a:prstGeom>
+        </p:spPr>
         <p:txBody>
           <a:bodyPr vert="eaVert"/>
-          <a:lstStyle/>
+          <a:lstStyle>
+            <a:lvl1pPr>
+              <a:defRPr b="0"/>
+            </a:lvl1pPr>
+            <a:lvl2pPr>
+              <a:defRPr b="0"/>
+            </a:lvl2pPr>
+          </a:lstStyle>
           <a:p>
             <a:pPr lvl="0"/>
             <a:r>
-              <a:rPr lang="en-US"/>
+              <a:rPr lang="en-US" dirty="0"/>
               <a:t>Edit Master text styles</a:t>
             </a:r>
           </a:p>
           <a:p>
             <a:pPr lvl="1"/>
             <a:r>
-              <a:rPr lang="en-US"/>
+              <a:rPr lang="en-US" dirty="0"/>
               <a:t>Second level</a:t>
             </a:r>
           </a:p>
           <a:p>
             <a:pPr lvl="2"/>
             <a:r>
-              <a:rPr lang="en-US"/>
+              <a:rPr lang="en-US" dirty="0"/>
               <a:t>Third level</a:t>
             </a:r>
           </a:p>
           <a:p>
             <a:pPr lvl="3"/>
             <a:r>
-              <a:rPr lang="en-US"/>
+              <a:rPr lang="en-US" dirty="0"/>
               <a:t>Fourth level</a:t>
             </a:r>
           </a:p>
           <a:p>
             <a:pPr lvl="4"/>
             <a:r>
-              <a:rPr lang="en-US"/>
+              <a:rPr lang="en-US" dirty="0"/>
               <a:t>Fifth level</a:t>
             </a:r>
-            <a:endParaRPr lang="en-GB"/>
+            <a:endParaRPr lang="en-GB" dirty="0"/>
           </a:p>
         </p:txBody>
       </p:sp>
@@ -1703,45 +1733,55 @@
             <a:off x="628650" y="273844"/>
             <a:ext cx="5800725" cy="4358879"/>
           </a:xfrm>
+          <a:prstGeom prst="rect">
+            <a:avLst/>
+          </a:prstGeom>
         </p:spPr>
         <p:txBody>
           <a:bodyPr vert="eaVert"/>
-          <a:lstStyle/>
+          <a:lstStyle>
+            <a:lvl1pPr>
+              <a:defRPr b="0"/>
+            </a:lvl1pPr>
+            <a:lvl2pPr>
+              <a:defRPr b="0"/>
+            </a:lvl2pPr>
+          </a:lstStyle>
           <a:p>
             <a:pPr lvl="0"/>
             <a:r>
-              <a:rPr lang="en-US"/>
+              <a:rPr lang="en-US" dirty="0"/>
               <a:t>Edit Master text styles</a:t>
             </a:r>
           </a:p>
           <a:p>
             <a:pPr lvl="1"/>
             <a:r>
-              <a:rPr lang="en-US"/>
+              <a:rPr lang="en-US" dirty="0"/>
               <a:t>Second level</a:t>
             </a:r>
           </a:p>
           <a:p>
             <a:pPr lvl="2"/>
             <a:r>
-              <a:rPr lang="en-US"/>
+              <a:rPr lang="en-US" dirty="0"/>
               <a:t>Third level</a:t>
             </a:r>
           </a:p>
           <a:p>
             <a:pPr lvl="3"/>
             <a:r>
-              <a:rPr lang="en-US"/>
+              <a:rPr lang="en-US" dirty="0"/>
               <a:t>Fourth level</a:t>
             </a:r>
           </a:p>
           <a:p>
             <a:pPr lvl="4"/>
             <a:r>
-              <a:rPr lang="en-US"/>
+              <a:rPr lang="en-US" dirty="0"/>
               <a:t>Fifth level</a:t>
             </a:r>
-            <a:endParaRPr lang="en-GB"/>
+            <a:endParaRPr lang="en-GB" dirty="0"/>
           </a:p>
         </p:txBody>
       </p:sp>
@@ -3595,6 +3635,9 @@
             <a:off x="681470" y="676061"/>
             <a:ext cx="7804439" cy="445507"/>
           </a:xfrm>
+          <a:prstGeom prst="rect">
+            <a:avLst/>
+          </a:prstGeom>
         </p:spPr>
         <p:txBody>
           <a:bodyPr>
@@ -4283,6 +4326,9 @@
             <a:off x="270000" y="1080000"/>
             <a:ext cx="8584622" cy="3263504"/>
           </a:xfrm>
+          <a:prstGeom prst="rect">
+            <a:avLst/>
+          </a:prstGeom>
         </p:spPr>
         <p:txBody>
           <a:bodyPr/>
@@ -4571,7 +4617,7 @@
             <a:spLocks noGrp="1"/>
           </p:cNvSpPr>
           <p:nvPr>
-            <p:ph idx="1" hasCustomPrompt="1"/>
+            <p:ph idx="1"/>
           </p:nvPr>
         </p:nvSpPr>
         <p:spPr>
@@ -4579,19 +4625,23 @@
             <a:off x="270000" y="1080000"/>
             <a:ext cx="8584622" cy="3263504"/>
           </a:xfrm>
+          <a:prstGeom prst="rect">
+            <a:avLst/>
+          </a:prstGeom>
         </p:spPr>
         <p:txBody>
           <a:bodyPr/>
           <a:lstStyle>
-            <a:lvl1pPr marL="0" indent="0">
+            <a:lvl1pPr marL="285750" indent="-285750">
               <a:spcBef>
                 <a:spcPts val="0"/>
               </a:spcBef>
               <a:spcAft>
                 <a:spcPts val="900"/>
               </a:spcAft>
-              <a:buNone/>
-              <a:defRPr lang="en-US" sz="1575" b="1" kern="1200" dirty="0">
+              <a:buFont typeface="Arial" panose="020B0604020202020204" pitchFamily="34" charset="0"/>
+              <a:buChar char="•"/>
+              <a:defRPr lang="en-US" sz="1575" b="0" kern="1200" dirty="0">
                 <a:solidFill>
                   <a:schemeClr val="tx1"/>
                 </a:solidFill>
@@ -4600,15 +4650,16 @@
                 <a:cs typeface="+mn-cs"/>
               </a:defRPr>
             </a:lvl1pPr>
-            <a:lvl2pPr marL="0" indent="0">
+            <a:lvl2pPr marL="171450" indent="-171450">
               <a:spcBef>
                 <a:spcPts val="0"/>
               </a:spcBef>
               <a:spcAft>
                 <a:spcPts val="450"/>
               </a:spcAft>
-              <a:buNone/>
-              <a:defRPr lang="en-US" sz="1200" b="1" kern="1200" dirty="0">
+              <a:buFont typeface="Arial" panose="020B0604020202020204" pitchFamily="34" charset="0"/>
+              <a:buChar char="•"/>
+              <a:defRPr lang="en-US" sz="1200" b="0" kern="1200" dirty="0">
                 <a:solidFill>
                   <a:schemeClr val="tx1"/>
                 </a:solidFill>
@@ -4659,94 +4710,39 @@
             </a:lvl5pPr>
           </a:lstStyle>
           <a:p>
-            <a:pPr marL="0" lvl="0" indent="0" algn="l" defTabSz="685800" rtl="0" eaLnBrk="1" latinLnBrk="0" hangingPunct="1">
-              <a:lnSpc>
-                <a:spcPct val="90000"/>
-              </a:lnSpc>
-              <a:spcBef>
-                <a:spcPts val="0"/>
-              </a:spcBef>
-              <a:spcAft>
-                <a:spcPts val="900"/>
-              </a:spcAft>
-              <a:buFont typeface="Arial" panose="020B0604020202020204" pitchFamily="34" charset="0"/>
-              <a:buNone/>
-            </a:pPr>
+            <a:pPr lvl="0"/>
             <a:r>
               <a:rPr lang="en-US" dirty="0"/>
-              <a:t>Heading 1</a:t>
+              <a:t>Click to edit Master text styles</a:t>
             </a:r>
           </a:p>
           <a:p>
-            <a:pPr marL="0" lvl="1" indent="0" algn="l" defTabSz="685800" rtl="0" eaLnBrk="1" latinLnBrk="0" hangingPunct="1">
-              <a:lnSpc>
-                <a:spcPct val="90000"/>
-              </a:lnSpc>
-              <a:spcBef>
-                <a:spcPts val="0"/>
-              </a:spcBef>
-              <a:spcAft>
-                <a:spcPts val="450"/>
-              </a:spcAft>
-              <a:buFont typeface="Arial" panose="020B0604020202020204" pitchFamily="34" charset="0"/>
-              <a:buNone/>
-            </a:pPr>
+            <a:pPr lvl="1"/>
             <a:r>
               <a:rPr lang="en-US" dirty="0"/>
-              <a:t>Heading 2</a:t>
+              <a:t>Second level</a:t>
             </a:r>
           </a:p>
           <a:p>
-            <a:pPr marL="0" lvl="2" indent="0" algn="l" defTabSz="685800" rtl="0" eaLnBrk="1" latinLnBrk="0" hangingPunct="1">
-              <a:lnSpc>
-                <a:spcPct val="90000"/>
-              </a:lnSpc>
-              <a:spcBef>
-                <a:spcPts val="0"/>
-              </a:spcBef>
-              <a:spcAft>
-                <a:spcPts val="450"/>
-              </a:spcAft>
-              <a:buFont typeface="Arial" panose="020B0604020202020204" pitchFamily="34" charset="0"/>
-              <a:buNone/>
-            </a:pPr>
+            <a:pPr lvl="4"/>
             <a:r>
               <a:rPr lang="en-US" dirty="0"/>
-              <a:t>Body copy</a:t>
+              <a:t>Third level</a:t>
             </a:r>
           </a:p>
           <a:p>
-            <a:pPr marL="0" lvl="3" indent="-171450" algn="l" defTabSz="685800" rtl="0" eaLnBrk="1" latinLnBrk="0" hangingPunct="1">
-              <a:lnSpc>
-                <a:spcPct val="90000"/>
-              </a:lnSpc>
-              <a:spcBef>
-                <a:spcPts val="375"/>
-              </a:spcBef>
-              <a:buFont typeface="Arial" panose="020B0604020202020204" pitchFamily="34" charset="0"/>
-              <a:buChar char="•"/>
-            </a:pPr>
+            <a:pPr lvl="4"/>
             <a:r>
               <a:rPr lang="en-US" dirty="0"/>
-              <a:t>Bullet</a:t>
+              <a:t>Fourth level</a:t>
             </a:r>
           </a:p>
           <a:p>
-            <a:pPr marL="345600" lvl="4" indent="-171450" algn="l" defTabSz="685800" rtl="0" eaLnBrk="1" latinLnBrk="0" hangingPunct="1">
-              <a:lnSpc>
-                <a:spcPct val="90000"/>
-              </a:lnSpc>
-              <a:spcBef>
-                <a:spcPts val="375"/>
-              </a:spcBef>
-              <a:buFont typeface="Arial" panose="020B0604020202020204" pitchFamily="34" charset="0"/>
-              <a:buChar char="•"/>
-            </a:pPr>
+            <a:pPr lvl="4"/>
             <a:r>
               <a:rPr lang="en-US" dirty="0"/>
-              <a:t>Bullet sub</a:t>
+              <a:t>Fifth level</a:t>
             </a:r>
-            <a:endParaRPr lang="en-GB" dirty="0"/>
           </a:p>
         </p:txBody>
       </p:sp>
@@ -4952,6 +4948,9 @@
             <a:off x="623888" y="2842455"/>
             <a:ext cx="7886700" cy="300082"/>
           </a:xfrm>
+          <a:prstGeom prst="rect">
+            <a:avLst/>
+          </a:prstGeom>
         </p:spPr>
         <p:txBody>
           <a:bodyPr>
@@ -5231,6 +5230,9 @@
             <a:off x="681470" y="676061"/>
             <a:ext cx="7804439" cy="445507"/>
           </a:xfrm>
+          <a:prstGeom prst="rect">
+            <a:avLst/>
+          </a:prstGeom>
         </p:spPr>
         <p:txBody>
           <a:bodyPr>
@@ -5599,7 +5601,7 @@
             <a:spLocks noGrp="1"/>
           </p:cNvSpPr>
           <p:nvPr>
-            <p:ph sz="half" idx="1" hasCustomPrompt="1"/>
+            <p:ph sz="half" idx="1"/>
           </p:nvPr>
         </p:nvSpPr>
         <p:spPr>
@@ -5607,11 +5609,14 @@
             <a:off x="270000" y="1080000"/>
             <a:ext cx="4185000" cy="3533564"/>
           </a:xfrm>
+          <a:prstGeom prst="rect">
+            <a:avLst/>
+          </a:prstGeom>
         </p:spPr>
         <p:txBody>
           <a:bodyPr/>
           <a:lstStyle>
-            <a:lvl1pPr marL="0" indent="0" algn="l" defTabSz="685800" rtl="0" eaLnBrk="1" latinLnBrk="0" hangingPunct="1">
+            <a:lvl1pPr marL="285750" indent="-285750" algn="l" defTabSz="685800" rtl="0" eaLnBrk="1" latinLnBrk="0" hangingPunct="1">
               <a:lnSpc>
                 <a:spcPct val="90000"/>
               </a:lnSpc>
@@ -5622,11 +5627,13 @@
                 <a:spcPts val="900"/>
               </a:spcAft>
               <a:buFont typeface="Arial" panose="020B0604020202020204" pitchFamily="34" charset="0"/>
-              <a:buNone/>
-              <a:defRPr/>
+              <a:buChar char="•"/>
+              <a:defRPr b="0"/>
             </a:lvl1pPr>
-            <a:lvl2pPr>
-              <a:defRPr lang="en-US" sz="1200" b="1" kern="1200" dirty="0" smtClean="0">
+            <a:lvl2pPr marL="514350" indent="-171450">
+              <a:buFont typeface="Arial" panose="020B0604020202020204" pitchFamily="34" charset="0"/>
+              <a:buChar char="•"/>
+              <a:defRPr lang="en-US" sz="1200" b="0" kern="1200" dirty="0" smtClean="0">
                 <a:solidFill>
                   <a:schemeClr val="tx1"/>
                 </a:solidFill>
@@ -5673,7 +5680,50 @@
             </a:lvl5pPr>
           </a:lstStyle>
           <a:p>
-            <a:pPr marL="0" lvl="0" indent="0" algn="l" defTabSz="685800" rtl="0" eaLnBrk="1" latinLnBrk="0" hangingPunct="1">
+            <a:pPr lvl="0"/>
+            <a:r>
+              <a:rPr lang="en-US" dirty="0"/>
+              <a:t>Click to edit Master text styles</a:t>
+            </a:r>
+          </a:p>
+          <a:p>
+            <a:pPr lvl="1"/>
+            <a:r>
+              <a:rPr lang="en-US" dirty="0"/>
+              <a:t>Second level</a:t>
+            </a:r>
+          </a:p>
+        </p:txBody>
+      </p:sp>
+      <p:sp>
+        <p:nvSpPr>
+          <p:cNvPr id="4" name="Content Placeholder 3">
+            <a:extLst>
+              <a:ext uri="{FF2B5EF4-FFF2-40B4-BE49-F238E27FC236}">
+                <a16:creationId xmlns:a16="http://schemas.microsoft.com/office/drawing/2014/main" id="{2ABA3220-04BF-4C22-9F1D-EA71CB2E4D12}"/>
+              </a:ext>
+            </a:extLst>
+          </p:cNvPr>
+          <p:cNvSpPr>
+            <a:spLocks noGrp="1"/>
+          </p:cNvSpPr>
+          <p:nvPr>
+            <p:ph sz="half" idx="2"/>
+          </p:nvPr>
+        </p:nvSpPr>
+        <p:spPr>
+          <a:xfrm>
+            <a:off x="4668054" y="1080000"/>
+            <a:ext cx="4185000" cy="3533564"/>
+          </a:xfrm>
+          <a:prstGeom prst="rect">
+            <a:avLst/>
+          </a:prstGeom>
+        </p:spPr>
+        <p:txBody>
+          <a:bodyPr/>
+          <a:lstStyle>
+            <a:lvl1pPr marL="285750" indent="-285750" algn="l" defTabSz="685800" rtl="0" eaLnBrk="1" latinLnBrk="0" hangingPunct="1">
               <a:lnSpc>
                 <a:spcPct val="90000"/>
               </a:lnSpc>
@@ -5684,127 +5734,11 @@
                 <a:spcPts val="900"/>
               </a:spcAft>
               <a:buFont typeface="Arial" panose="020B0604020202020204" pitchFamily="34" charset="0"/>
-              <a:buNone/>
-            </a:pPr>
-            <a:r>
-              <a:rPr lang="en-US" dirty="0"/>
-              <a:t>Heading 1</a:t>
-            </a:r>
-          </a:p>
-          <a:p>
-            <a:pPr marL="0" lvl="1" indent="0" algn="l" defTabSz="685800" rtl="0" eaLnBrk="1" latinLnBrk="0" hangingPunct="1">
-              <a:lnSpc>
-                <a:spcPct val="90000"/>
-              </a:lnSpc>
-              <a:spcBef>
-                <a:spcPts val="0"/>
-              </a:spcBef>
-              <a:spcAft>
-                <a:spcPts val="450"/>
-              </a:spcAft>
-              <a:buFont typeface="Arial" panose="020B0604020202020204" pitchFamily="34" charset="0"/>
-              <a:buNone/>
-            </a:pPr>
-            <a:r>
-              <a:rPr lang="en-US" dirty="0"/>
-              <a:t>Heading 2</a:t>
-            </a:r>
-          </a:p>
-          <a:p>
-            <a:pPr marL="0" lvl="2" indent="0" algn="l" defTabSz="685800" rtl="0" eaLnBrk="1" latinLnBrk="0" hangingPunct="1">
-              <a:lnSpc>
-                <a:spcPct val="90000"/>
-              </a:lnSpc>
-              <a:spcBef>
-                <a:spcPts val="0"/>
-              </a:spcBef>
-              <a:spcAft>
-                <a:spcPts val="450"/>
-              </a:spcAft>
-              <a:buFont typeface="Arial" panose="020B0604020202020204" pitchFamily="34" charset="0"/>
-              <a:buNone/>
-            </a:pPr>
-            <a:r>
-              <a:rPr lang="en-US" dirty="0"/>
-              <a:t>Body copy</a:t>
-            </a:r>
-          </a:p>
-          <a:p>
-            <a:pPr marL="0" lvl="3" indent="-171450" algn="l" defTabSz="685800" rtl="0" eaLnBrk="1" latinLnBrk="0" hangingPunct="1">
-              <a:lnSpc>
-                <a:spcPct val="90000"/>
-              </a:lnSpc>
-              <a:spcBef>
-                <a:spcPts val="375"/>
-              </a:spcBef>
-              <a:buFont typeface="Arial" panose="020B0604020202020204" pitchFamily="34" charset="0"/>
               <a:buChar char="•"/>
-            </a:pPr>
-            <a:r>
-              <a:rPr lang="en-US" dirty="0"/>
-              <a:t>Bullet</a:t>
-            </a:r>
-          </a:p>
-          <a:p>
-            <a:pPr marL="345600" lvl="4" indent="-171450" algn="l" defTabSz="685800" rtl="0" eaLnBrk="1" latinLnBrk="0" hangingPunct="1">
-              <a:lnSpc>
-                <a:spcPct val="90000"/>
-              </a:lnSpc>
-              <a:spcBef>
-                <a:spcPts val="375"/>
-              </a:spcBef>
-              <a:buFont typeface="Arial" panose="020B0604020202020204" pitchFamily="34" charset="0"/>
-              <a:buChar char="•"/>
-            </a:pPr>
-            <a:r>
-              <a:rPr lang="en-US" dirty="0"/>
-              <a:t>Bullet sub</a:t>
-            </a:r>
-            <a:endParaRPr lang="en-GB" dirty="0"/>
-          </a:p>
-        </p:txBody>
-      </p:sp>
-      <p:sp>
-        <p:nvSpPr>
-          <p:cNvPr id="4" name="Content Placeholder 3">
-            <a:extLst>
-              <a:ext uri="{FF2B5EF4-FFF2-40B4-BE49-F238E27FC236}">
-                <a16:creationId xmlns:a16="http://schemas.microsoft.com/office/drawing/2014/main" id="{2ABA3220-04BF-4C22-9F1D-EA71CB2E4D12}"/>
-              </a:ext>
-            </a:extLst>
-          </p:cNvPr>
-          <p:cNvSpPr>
-            <a:spLocks noGrp="1"/>
-          </p:cNvSpPr>
-          <p:nvPr>
-            <p:ph sz="half" idx="2" hasCustomPrompt="1"/>
-          </p:nvPr>
-        </p:nvSpPr>
-        <p:spPr>
-          <a:xfrm>
-            <a:off x="4668054" y="1080000"/>
-            <a:ext cx="4185000" cy="3533564"/>
-          </a:xfrm>
-        </p:spPr>
-        <p:txBody>
-          <a:bodyPr/>
-          <a:lstStyle>
-            <a:lvl1pPr marL="0" indent="0" algn="l" defTabSz="685800" rtl="0" eaLnBrk="1" latinLnBrk="0" hangingPunct="1">
-              <a:lnSpc>
-                <a:spcPct val="90000"/>
-              </a:lnSpc>
-              <a:spcBef>
-                <a:spcPts val="0"/>
-              </a:spcBef>
-              <a:spcAft>
-                <a:spcPts val="900"/>
-              </a:spcAft>
-              <a:buFont typeface="Arial" panose="020B0604020202020204" pitchFamily="34" charset="0"/>
-              <a:buNone/>
-              <a:defRPr/>
+              <a:defRPr b="0"/>
             </a:lvl1pPr>
             <a:lvl2pPr>
-              <a:defRPr lang="en-US" sz="1200" b="1" kern="1200" dirty="0" smtClean="0">
+              <a:defRPr lang="en-US" sz="1200" b="0" kern="1200" dirty="0" smtClean="0">
                 <a:solidFill>
                   <a:schemeClr val="tx1"/>
                 </a:solidFill>
@@ -5851,94 +5785,18 @@
             </a:lvl5pPr>
           </a:lstStyle>
           <a:p>
-            <a:pPr marL="0" lvl="0" indent="0" algn="l" defTabSz="685800" rtl="0" eaLnBrk="1" latinLnBrk="0" hangingPunct="1">
-              <a:lnSpc>
-                <a:spcPct val="90000"/>
-              </a:lnSpc>
-              <a:spcBef>
-                <a:spcPts val="0"/>
-              </a:spcBef>
-              <a:spcAft>
-                <a:spcPts val="900"/>
-              </a:spcAft>
-              <a:buFont typeface="Arial" panose="020B0604020202020204" pitchFamily="34" charset="0"/>
-              <a:buNone/>
-            </a:pPr>
+            <a:pPr lvl="0"/>
             <a:r>
               <a:rPr lang="en-US" dirty="0"/>
-              <a:t>Heading 1</a:t>
+              <a:t>Click to edit Master text styles</a:t>
             </a:r>
           </a:p>
           <a:p>
-            <a:pPr marL="0" lvl="1" indent="0" algn="l" defTabSz="685800" rtl="0" eaLnBrk="1" latinLnBrk="0" hangingPunct="1">
-              <a:lnSpc>
-                <a:spcPct val="90000"/>
-              </a:lnSpc>
-              <a:spcBef>
-                <a:spcPts val="0"/>
-              </a:spcBef>
-              <a:spcAft>
-                <a:spcPts val="450"/>
-              </a:spcAft>
-              <a:buFont typeface="Arial" panose="020B0604020202020204" pitchFamily="34" charset="0"/>
-              <a:buNone/>
-            </a:pPr>
+            <a:pPr lvl="1"/>
             <a:r>
               <a:rPr lang="en-US" dirty="0"/>
-              <a:t>Heading 2</a:t>
+              <a:t>Second level</a:t>
             </a:r>
-          </a:p>
-          <a:p>
-            <a:pPr marL="0" lvl="2" indent="0" algn="l" defTabSz="685800" rtl="0" eaLnBrk="1" latinLnBrk="0" hangingPunct="1">
-              <a:lnSpc>
-                <a:spcPct val="90000"/>
-              </a:lnSpc>
-              <a:spcBef>
-                <a:spcPts val="0"/>
-              </a:spcBef>
-              <a:spcAft>
-                <a:spcPts val="450"/>
-              </a:spcAft>
-              <a:buFont typeface="Arial" panose="020B0604020202020204" pitchFamily="34" charset="0"/>
-              <a:buNone/>
-            </a:pPr>
-            <a:r>
-              <a:rPr lang="en-US" dirty="0"/>
-              <a:t>Body copy</a:t>
-            </a:r>
-          </a:p>
-          <a:p>
-            <a:pPr marL="0" lvl="3" indent="-171450" algn="l" defTabSz="685800" rtl="0" eaLnBrk="1" latinLnBrk="0" hangingPunct="1">
-              <a:lnSpc>
-                <a:spcPct val="90000"/>
-              </a:lnSpc>
-              <a:spcBef>
-                <a:spcPts val="375"/>
-              </a:spcBef>
-              <a:buFont typeface="Arial" panose="020B0604020202020204" pitchFamily="34" charset="0"/>
-              <a:buChar char="•"/>
-            </a:pPr>
-            <a:r>
-              <a:rPr lang="en-US" dirty="0"/>
-              <a:t>Bullet</a:t>
-            </a:r>
-          </a:p>
-          <a:p>
-            <a:pPr marL="345600" lvl="4" indent="-171450" algn="l" defTabSz="685800" rtl="0" eaLnBrk="1" latinLnBrk="0" hangingPunct="1">
-              <a:lnSpc>
-                <a:spcPct val="90000"/>
-              </a:lnSpc>
-              <a:spcBef>
-                <a:spcPts val="375"/>
-              </a:spcBef>
-              <a:buFont typeface="Arial" panose="020B0604020202020204" pitchFamily="34" charset="0"/>
-              <a:buChar char="•"/>
-            </a:pPr>
-            <a:r>
-              <a:rPr lang="en-US" dirty="0"/>
-              <a:t>Bullet sub</a:t>
-            </a:r>
-            <a:endParaRPr lang="en-GB" dirty="0"/>
           </a:p>
         </p:txBody>
       </p:sp>
@@ -6138,6 +5996,9 @@
             <a:off x="276386" y="1080000"/>
             <a:ext cx="4185000" cy="617934"/>
           </a:xfrm>
+          <a:prstGeom prst="rect">
+            <a:avLst/>
+          </a:prstGeom>
         </p:spPr>
         <p:txBody>
           <a:bodyPr anchor="t" anchorCtr="0"/>
@@ -6201,7 +6062,7 @@
             <a:spLocks noGrp="1"/>
           </p:cNvSpPr>
           <p:nvPr>
-            <p:ph sz="half" idx="2" hasCustomPrompt="1"/>
+            <p:ph sz="half" idx="2"/>
           </p:nvPr>
         </p:nvSpPr>
         <p:spPr>
@@ -6209,11 +6070,14 @@
             <a:off x="276386" y="1485000"/>
             <a:ext cx="4185000" cy="2976164"/>
           </a:xfrm>
+          <a:prstGeom prst="rect">
+            <a:avLst/>
+          </a:prstGeom>
         </p:spPr>
         <p:txBody>
           <a:bodyPr/>
           <a:lstStyle>
-            <a:lvl1pPr marL="0" indent="0" algn="l" defTabSz="685800" rtl="0" eaLnBrk="1" latinLnBrk="0" hangingPunct="1">
+            <a:lvl1pPr marL="285750" indent="-285750" algn="l" defTabSz="685800" rtl="0" eaLnBrk="1" latinLnBrk="0" hangingPunct="1">
               <a:lnSpc>
                 <a:spcPct val="90000"/>
               </a:lnSpc>
@@ -6224,10 +6088,10 @@
                 <a:spcPts val="900"/>
               </a:spcAft>
               <a:buFont typeface="Arial" panose="020B0604020202020204" pitchFamily="34" charset="0"/>
-              <a:buNone/>
-              <a:defRPr/>
+              <a:buChar char="•"/>
+              <a:defRPr b="0"/>
             </a:lvl1pPr>
-            <a:lvl2pPr marL="0" indent="0" algn="l" defTabSz="685800" rtl="0" eaLnBrk="1" latinLnBrk="0" hangingPunct="1">
+            <a:lvl2pPr marL="171450" indent="-171450" algn="l" defTabSz="685800" rtl="0" eaLnBrk="1" latinLnBrk="0" hangingPunct="1">
               <a:lnSpc>
                 <a:spcPct val="90000"/>
               </a:lnSpc>
@@ -6238,8 +6102,8 @@
                 <a:spcPts val="450"/>
               </a:spcAft>
               <a:buFont typeface="Arial" panose="020B0604020202020204" pitchFamily="34" charset="0"/>
-              <a:buNone/>
-              <a:defRPr/>
+              <a:buChar char="•"/>
+              <a:defRPr b="0"/>
             </a:lvl2pPr>
             <a:lvl3pPr marL="0" indent="0" algn="l" defTabSz="685800" rtl="0" eaLnBrk="1" latinLnBrk="0" hangingPunct="1">
               <a:lnSpc>
@@ -6279,7 +6143,124 @@
             </a:lvl5pPr>
           </a:lstStyle>
           <a:p>
-            <a:pPr marL="0" lvl="0" indent="0" algn="l" defTabSz="685800" rtl="0" eaLnBrk="1" latinLnBrk="0" hangingPunct="1">
+            <a:pPr lvl="0"/>
+            <a:r>
+              <a:rPr lang="en-US" dirty="0"/>
+              <a:t>Click to edit Master text styles</a:t>
+            </a:r>
+          </a:p>
+          <a:p>
+            <a:pPr lvl="1"/>
+            <a:r>
+              <a:rPr lang="en-US" dirty="0"/>
+              <a:t>Second level</a:t>
+            </a:r>
+          </a:p>
+        </p:txBody>
+      </p:sp>
+      <p:sp>
+        <p:nvSpPr>
+          <p:cNvPr id="5" name="Text Placeholder 4">
+            <a:extLst>
+              <a:ext uri="{FF2B5EF4-FFF2-40B4-BE49-F238E27FC236}">
+                <a16:creationId xmlns:a16="http://schemas.microsoft.com/office/drawing/2014/main" id="{164D9511-94F7-4D8A-B308-9F45F8C31020}"/>
+              </a:ext>
+            </a:extLst>
+          </p:cNvPr>
+          <p:cNvSpPr>
+            <a:spLocks noGrp="1"/>
+          </p:cNvSpPr>
+          <p:nvPr>
+            <p:ph type="body" sz="quarter" idx="3"/>
+          </p:nvPr>
+        </p:nvSpPr>
+        <p:spPr>
+          <a:xfrm>
+            <a:off x="4668054" y="1080000"/>
+            <a:ext cx="4185000" cy="617934"/>
+          </a:xfrm>
+          <a:prstGeom prst="rect">
+            <a:avLst/>
+          </a:prstGeom>
+        </p:spPr>
+        <p:txBody>
+          <a:bodyPr anchor="t" anchorCtr="0"/>
+          <a:lstStyle>
+            <a:lvl1pPr marL="0" indent="0">
+              <a:buNone/>
+              <a:defRPr sz="1800" b="1"/>
+            </a:lvl1pPr>
+            <a:lvl2pPr marL="342900" indent="0">
+              <a:buNone/>
+              <a:defRPr sz="1500" b="1"/>
+            </a:lvl2pPr>
+            <a:lvl3pPr marL="685800" indent="0">
+              <a:buNone/>
+              <a:defRPr sz="1350" b="1"/>
+            </a:lvl3pPr>
+            <a:lvl4pPr marL="1028700" indent="0">
+              <a:buNone/>
+              <a:defRPr sz="1200" b="1"/>
+            </a:lvl4pPr>
+            <a:lvl5pPr marL="1371600" indent="0">
+              <a:buNone/>
+              <a:defRPr sz="1200" b="1"/>
+            </a:lvl5pPr>
+            <a:lvl6pPr marL="1714500" indent="0">
+              <a:buNone/>
+              <a:defRPr sz="1200" b="1"/>
+            </a:lvl6pPr>
+            <a:lvl7pPr marL="2057400" indent="0">
+              <a:buNone/>
+              <a:defRPr sz="1200" b="1"/>
+            </a:lvl7pPr>
+            <a:lvl8pPr marL="2400300" indent="0">
+              <a:buNone/>
+              <a:defRPr sz="1200" b="1"/>
+            </a:lvl8pPr>
+            <a:lvl9pPr marL="2743200" indent="0">
+              <a:buNone/>
+              <a:defRPr sz="1200" b="1"/>
+            </a:lvl9pPr>
+          </a:lstStyle>
+          <a:p>
+            <a:pPr lvl="0"/>
+            <a:r>
+              <a:rPr lang="en-US"/>
+              <a:t>Edit Master text styles</a:t>
+            </a:r>
+          </a:p>
+        </p:txBody>
+      </p:sp>
+      <p:sp>
+        <p:nvSpPr>
+          <p:cNvPr id="6" name="Content Placeholder 5">
+            <a:extLst>
+              <a:ext uri="{FF2B5EF4-FFF2-40B4-BE49-F238E27FC236}">
+                <a16:creationId xmlns:a16="http://schemas.microsoft.com/office/drawing/2014/main" id="{D14B37DB-BE92-439C-B307-B67909DBB68B}"/>
+              </a:ext>
+            </a:extLst>
+          </p:cNvPr>
+          <p:cNvSpPr>
+            <a:spLocks noGrp="1"/>
+          </p:cNvSpPr>
+          <p:nvPr>
+            <p:ph sz="quarter" idx="4"/>
+          </p:nvPr>
+        </p:nvSpPr>
+        <p:spPr>
+          <a:xfrm>
+            <a:off x="4668054" y="1485000"/>
+            <a:ext cx="4185000" cy="2976164"/>
+          </a:xfrm>
+          <a:prstGeom prst="rect">
+            <a:avLst/>
+          </a:prstGeom>
+        </p:spPr>
+        <p:txBody>
+          <a:bodyPr/>
+          <a:lstStyle>
+            <a:lvl1pPr marL="285750" indent="-285750" algn="l" defTabSz="685800" rtl="0" eaLnBrk="1" latinLnBrk="0" hangingPunct="1">
               <a:lnSpc>
                 <a:spcPct val="90000"/>
               </a:lnSpc>
@@ -6290,15 +6271,10 @@
                 <a:spcPts val="900"/>
               </a:spcAft>
               <a:buFont typeface="Arial" panose="020B0604020202020204" pitchFamily="34" charset="0"/>
-              <a:buNone/>
-            </a:pPr>
-            <a:r>
-              <a:rPr lang="en-US" dirty="0"/>
-              <a:t>Heading 1</a:t>
-            </a:r>
-          </a:p>
-          <a:p>
-            <a:pPr marL="0" lvl="1" indent="0" algn="l" defTabSz="685800" rtl="0" eaLnBrk="1" latinLnBrk="0" hangingPunct="1">
+              <a:buChar char="•"/>
+              <a:defRPr b="0"/>
+            </a:lvl1pPr>
+            <a:lvl2pPr marL="171450" indent="-171450" algn="l" defTabSz="685800" rtl="0" eaLnBrk="1" latinLnBrk="0" hangingPunct="1">
               <a:lnSpc>
                 <a:spcPct val="90000"/>
               </a:lnSpc>
@@ -6309,190 +6285,8 @@
                 <a:spcPts val="450"/>
               </a:spcAft>
               <a:buFont typeface="Arial" panose="020B0604020202020204" pitchFamily="34" charset="0"/>
-              <a:buNone/>
-            </a:pPr>
-            <a:r>
-              <a:rPr lang="en-US" dirty="0"/>
-              <a:t>Heading 2</a:t>
-            </a:r>
-          </a:p>
-          <a:p>
-            <a:pPr marL="0" lvl="2" indent="0" algn="l" defTabSz="685800" rtl="0" eaLnBrk="1" latinLnBrk="0" hangingPunct="1">
-              <a:lnSpc>
-                <a:spcPct val="90000"/>
-              </a:lnSpc>
-              <a:spcBef>
-                <a:spcPts val="0"/>
-              </a:spcBef>
-              <a:spcAft>
-                <a:spcPts val="450"/>
-              </a:spcAft>
-              <a:buFont typeface="Arial" panose="020B0604020202020204" pitchFamily="34" charset="0"/>
-              <a:buNone/>
-            </a:pPr>
-            <a:r>
-              <a:rPr lang="en-US" dirty="0"/>
-              <a:t>Body copy</a:t>
-            </a:r>
-          </a:p>
-          <a:p>
-            <a:pPr marL="0" lvl="3" indent="-171450" algn="l" defTabSz="685800" rtl="0" eaLnBrk="1" latinLnBrk="0" hangingPunct="1">
-              <a:lnSpc>
-                <a:spcPct val="90000"/>
-              </a:lnSpc>
-              <a:spcBef>
-                <a:spcPts val="375"/>
-              </a:spcBef>
-              <a:buFont typeface="Arial" panose="020B0604020202020204" pitchFamily="34" charset="0"/>
               <a:buChar char="•"/>
-            </a:pPr>
-            <a:r>
-              <a:rPr lang="en-US" dirty="0"/>
-              <a:t>Bullet</a:t>
-            </a:r>
-          </a:p>
-          <a:p>
-            <a:pPr marL="345600" lvl="4" indent="-171450" algn="l" defTabSz="685800" rtl="0" eaLnBrk="1" latinLnBrk="0" hangingPunct="1">
-              <a:lnSpc>
-                <a:spcPct val="90000"/>
-              </a:lnSpc>
-              <a:spcBef>
-                <a:spcPts val="375"/>
-              </a:spcBef>
-              <a:buFont typeface="Arial" panose="020B0604020202020204" pitchFamily="34" charset="0"/>
-              <a:buChar char="•"/>
-            </a:pPr>
-            <a:r>
-              <a:rPr lang="en-US" dirty="0"/>
-              <a:t>Bullet sub</a:t>
-            </a:r>
-            <a:endParaRPr lang="en-GB" dirty="0"/>
-          </a:p>
-        </p:txBody>
-      </p:sp>
-      <p:sp>
-        <p:nvSpPr>
-          <p:cNvPr id="5" name="Text Placeholder 4">
-            <a:extLst>
-              <a:ext uri="{FF2B5EF4-FFF2-40B4-BE49-F238E27FC236}">
-                <a16:creationId xmlns:a16="http://schemas.microsoft.com/office/drawing/2014/main" id="{164D9511-94F7-4D8A-B308-9F45F8C31020}"/>
-              </a:ext>
-            </a:extLst>
-          </p:cNvPr>
-          <p:cNvSpPr>
-            <a:spLocks noGrp="1"/>
-          </p:cNvSpPr>
-          <p:nvPr>
-            <p:ph type="body" sz="quarter" idx="3"/>
-          </p:nvPr>
-        </p:nvSpPr>
-        <p:spPr>
-          <a:xfrm>
-            <a:off x="4668054" y="1080000"/>
-            <a:ext cx="4185000" cy="617934"/>
-          </a:xfrm>
-        </p:spPr>
-        <p:txBody>
-          <a:bodyPr anchor="t" anchorCtr="0"/>
-          <a:lstStyle>
-            <a:lvl1pPr marL="0" indent="0">
-              <a:buNone/>
-              <a:defRPr sz="1800" b="1"/>
-            </a:lvl1pPr>
-            <a:lvl2pPr marL="342900" indent="0">
-              <a:buNone/>
-              <a:defRPr sz="1500" b="1"/>
-            </a:lvl2pPr>
-            <a:lvl3pPr marL="685800" indent="0">
-              <a:buNone/>
-              <a:defRPr sz="1350" b="1"/>
-            </a:lvl3pPr>
-            <a:lvl4pPr marL="1028700" indent="0">
-              <a:buNone/>
-              <a:defRPr sz="1200" b="1"/>
-            </a:lvl4pPr>
-            <a:lvl5pPr marL="1371600" indent="0">
-              <a:buNone/>
-              <a:defRPr sz="1200" b="1"/>
-            </a:lvl5pPr>
-            <a:lvl6pPr marL="1714500" indent="0">
-              <a:buNone/>
-              <a:defRPr sz="1200" b="1"/>
-            </a:lvl6pPr>
-            <a:lvl7pPr marL="2057400" indent="0">
-              <a:buNone/>
-              <a:defRPr sz="1200" b="1"/>
-            </a:lvl7pPr>
-            <a:lvl8pPr marL="2400300" indent="0">
-              <a:buNone/>
-              <a:defRPr sz="1200" b="1"/>
-            </a:lvl8pPr>
-            <a:lvl9pPr marL="2743200" indent="0">
-              <a:buNone/>
-              <a:defRPr sz="1200" b="1"/>
-            </a:lvl9pPr>
-          </a:lstStyle>
-          <a:p>
-            <a:pPr lvl="0"/>
-            <a:r>
-              <a:rPr lang="en-US"/>
-              <a:t>Edit Master text styles</a:t>
-            </a:r>
-          </a:p>
-        </p:txBody>
-      </p:sp>
-      <p:sp>
-        <p:nvSpPr>
-          <p:cNvPr id="6" name="Content Placeholder 5">
-            <a:extLst>
-              <a:ext uri="{FF2B5EF4-FFF2-40B4-BE49-F238E27FC236}">
-                <a16:creationId xmlns:a16="http://schemas.microsoft.com/office/drawing/2014/main" id="{D14B37DB-BE92-439C-B307-B67909DBB68B}"/>
-              </a:ext>
-            </a:extLst>
-          </p:cNvPr>
-          <p:cNvSpPr>
-            <a:spLocks noGrp="1"/>
-          </p:cNvSpPr>
-          <p:nvPr>
-            <p:ph sz="quarter" idx="4" hasCustomPrompt="1"/>
-          </p:nvPr>
-        </p:nvSpPr>
-        <p:spPr>
-          <a:xfrm>
-            <a:off x="4668054" y="1485000"/>
-            <a:ext cx="4185000" cy="2976164"/>
-          </a:xfrm>
-        </p:spPr>
-        <p:txBody>
-          <a:bodyPr/>
-          <a:lstStyle>
-            <a:lvl1pPr marL="0" indent="0" algn="l" defTabSz="685800" rtl="0" eaLnBrk="1" latinLnBrk="0" hangingPunct="1">
-              <a:lnSpc>
-                <a:spcPct val="90000"/>
-              </a:lnSpc>
-              <a:spcBef>
-                <a:spcPts val="0"/>
-              </a:spcBef>
-              <a:spcAft>
-                <a:spcPts val="900"/>
-              </a:spcAft>
-              <a:buFont typeface="Arial" panose="020B0604020202020204" pitchFamily="34" charset="0"/>
-              <a:buNone/>
-              <a:defRPr/>
-            </a:lvl1pPr>
-            <a:lvl2pPr marL="0" indent="0" algn="l" defTabSz="685800" rtl="0" eaLnBrk="1" latinLnBrk="0" hangingPunct="1">
-              <a:lnSpc>
-                <a:spcPct val="90000"/>
-              </a:lnSpc>
-              <a:spcBef>
-                <a:spcPts val="0"/>
-              </a:spcBef>
-              <a:spcAft>
-                <a:spcPts val="450"/>
-              </a:spcAft>
-              <a:buFont typeface="Arial" panose="020B0604020202020204" pitchFamily="34" charset="0"/>
-              <a:buNone/>
-              <a:defRPr/>
+              <a:defRPr b="0"/>
             </a:lvl2pPr>
             <a:lvl3pPr marL="0" indent="0" algn="l" defTabSz="685800" rtl="0" eaLnBrk="1" latinLnBrk="0" hangingPunct="1">
               <a:lnSpc>
@@ -6532,94 +6326,18 @@
             </a:lvl5pPr>
           </a:lstStyle>
           <a:p>
-            <a:pPr marL="0" lvl="0" indent="0" algn="l" defTabSz="685800" rtl="0" eaLnBrk="1" latinLnBrk="0" hangingPunct="1">
-              <a:lnSpc>
-                <a:spcPct val="90000"/>
-              </a:lnSpc>
-              <a:spcBef>
-                <a:spcPts val="0"/>
-              </a:spcBef>
-              <a:spcAft>
-                <a:spcPts val="900"/>
-              </a:spcAft>
-              <a:buFont typeface="Arial" panose="020B0604020202020204" pitchFamily="34" charset="0"/>
-              <a:buNone/>
-            </a:pPr>
+            <a:pPr lvl="0"/>
             <a:r>
               <a:rPr lang="en-US" dirty="0"/>
-              <a:t>Heading 1</a:t>
+              <a:t>Click to edit Master text styles</a:t>
             </a:r>
           </a:p>
           <a:p>
-            <a:pPr marL="0" lvl="1" indent="0" algn="l" defTabSz="685800" rtl="0" eaLnBrk="1" latinLnBrk="0" hangingPunct="1">
-              <a:lnSpc>
-                <a:spcPct val="90000"/>
-              </a:lnSpc>
-              <a:spcBef>
-                <a:spcPts val="0"/>
-              </a:spcBef>
-              <a:spcAft>
-                <a:spcPts val="450"/>
-              </a:spcAft>
-              <a:buFont typeface="Arial" panose="020B0604020202020204" pitchFamily="34" charset="0"/>
-              <a:buNone/>
-            </a:pPr>
+            <a:pPr lvl="1"/>
             <a:r>
               <a:rPr lang="en-US" dirty="0"/>
-              <a:t>Heading 2</a:t>
+              <a:t>Second level</a:t>
             </a:r>
-          </a:p>
-          <a:p>
-            <a:pPr marL="0" lvl="2" indent="0" algn="l" defTabSz="685800" rtl="0" eaLnBrk="1" latinLnBrk="0" hangingPunct="1">
-              <a:lnSpc>
-                <a:spcPct val="90000"/>
-              </a:lnSpc>
-              <a:spcBef>
-                <a:spcPts val="0"/>
-              </a:spcBef>
-              <a:spcAft>
-                <a:spcPts val="450"/>
-              </a:spcAft>
-              <a:buFont typeface="Arial" panose="020B0604020202020204" pitchFamily="34" charset="0"/>
-              <a:buNone/>
-            </a:pPr>
-            <a:r>
-              <a:rPr lang="en-US" dirty="0"/>
-              <a:t>Body copy</a:t>
-            </a:r>
-          </a:p>
-          <a:p>
-            <a:pPr marL="0" lvl="3" indent="-171450" algn="l" defTabSz="685800" rtl="0" eaLnBrk="1" latinLnBrk="0" hangingPunct="1">
-              <a:lnSpc>
-                <a:spcPct val="90000"/>
-              </a:lnSpc>
-              <a:spcBef>
-                <a:spcPts val="375"/>
-              </a:spcBef>
-              <a:buFont typeface="Arial" panose="020B0604020202020204" pitchFamily="34" charset="0"/>
-              <a:buChar char="•"/>
-            </a:pPr>
-            <a:r>
-              <a:rPr lang="en-US" dirty="0"/>
-              <a:t>Bullet</a:t>
-            </a:r>
-          </a:p>
-          <a:p>
-            <a:pPr marL="345600" lvl="4" indent="-171450" algn="l" defTabSz="685800" rtl="0" eaLnBrk="1" latinLnBrk="0" hangingPunct="1">
-              <a:lnSpc>
-                <a:spcPct val="90000"/>
-              </a:lnSpc>
-              <a:spcBef>
-                <a:spcPts val="375"/>
-              </a:spcBef>
-              <a:buFont typeface="Arial" panose="020B0604020202020204" pitchFamily="34" charset="0"/>
-              <a:buChar char="•"/>
-            </a:pPr>
-            <a:r>
-              <a:rPr lang="en-US" dirty="0"/>
-              <a:t>Bullet sub</a:t>
-            </a:r>
-            <a:endParaRPr lang="en-GB" dirty="0"/>
           </a:p>
         </p:txBody>
       </p:sp>
@@ -7085,128 +6803,6 @@
       </p:sp>
       <p:sp>
         <p:nvSpPr>
-          <p:cNvPr id="3" name="Text Placeholder 2">
-            <a:extLst>
-              <a:ext uri="{FF2B5EF4-FFF2-40B4-BE49-F238E27FC236}">
-                <a16:creationId xmlns:a16="http://schemas.microsoft.com/office/drawing/2014/main" id="{7B1BCFDC-5D94-4F0B-82D3-04481417E05B}"/>
-              </a:ext>
-            </a:extLst>
-          </p:cNvPr>
-          <p:cNvSpPr>
-            <a:spLocks noGrp="1"/>
-          </p:cNvSpPr>
-          <p:nvPr>
-            <p:ph type="body" idx="1"/>
-          </p:nvPr>
-        </p:nvSpPr>
-        <p:spPr>
-          <a:xfrm>
-            <a:off x="270000" y="1080000"/>
-            <a:ext cx="8583055" cy="3263504"/>
-          </a:xfrm>
-          <a:prstGeom prst="rect">
-            <a:avLst/>
-          </a:prstGeom>
-        </p:spPr>
-        <p:txBody>
-          <a:bodyPr vert="horz" lIns="91440" tIns="45720" rIns="91440" bIns="45720" rtlCol="0">
-            <a:normAutofit/>
-          </a:bodyPr>
-          <a:lstStyle/>
-          <a:p>
-            <a:pPr marL="0" lvl="0" indent="0" algn="l" defTabSz="685800" rtl="0" eaLnBrk="1" latinLnBrk="0" hangingPunct="1">
-              <a:lnSpc>
-                <a:spcPct val="90000"/>
-              </a:lnSpc>
-              <a:spcBef>
-                <a:spcPts val="0"/>
-              </a:spcBef>
-              <a:spcAft>
-                <a:spcPts val="900"/>
-              </a:spcAft>
-              <a:buFont typeface="Arial" panose="020B0604020202020204" pitchFamily="34" charset="0"/>
-              <a:buNone/>
-            </a:pPr>
-            <a:r>
-              <a:rPr lang="en-US" dirty="0"/>
-              <a:t>Heading 1</a:t>
-            </a:r>
-          </a:p>
-          <a:p>
-            <a:pPr marL="0" lvl="1" indent="0" algn="l" defTabSz="685800" rtl="0" eaLnBrk="1" latinLnBrk="0" hangingPunct="1">
-              <a:lnSpc>
-                <a:spcPct val="90000"/>
-              </a:lnSpc>
-              <a:spcBef>
-                <a:spcPts val="0"/>
-              </a:spcBef>
-              <a:spcAft>
-                <a:spcPts val="450"/>
-              </a:spcAft>
-              <a:buFont typeface="Arial" panose="020B0604020202020204" pitchFamily="34" charset="0"/>
-              <a:buNone/>
-            </a:pPr>
-            <a:r>
-              <a:rPr lang="en-US" dirty="0"/>
-              <a:t>Heading 2</a:t>
-            </a:r>
-          </a:p>
-          <a:p>
-            <a:pPr marL="0" lvl="2" indent="0" algn="l" defTabSz="685800" rtl="0" eaLnBrk="1" latinLnBrk="0" hangingPunct="1">
-              <a:lnSpc>
-                <a:spcPct val="90000"/>
-              </a:lnSpc>
-              <a:spcBef>
-                <a:spcPts val="0"/>
-              </a:spcBef>
-              <a:spcAft>
-                <a:spcPts val="450"/>
-              </a:spcAft>
-              <a:buFont typeface="Arial" panose="020B0604020202020204" pitchFamily="34" charset="0"/>
-              <a:buNone/>
-            </a:pPr>
-            <a:r>
-              <a:rPr lang="en-US" dirty="0"/>
-              <a:t>Body copy</a:t>
-            </a:r>
-          </a:p>
-          <a:p>
-            <a:pPr marL="0" lvl="3" indent="-171450" algn="l" defTabSz="685800" rtl="0" eaLnBrk="1" latinLnBrk="0" hangingPunct="1">
-              <a:lnSpc>
-                <a:spcPct val="90000"/>
-              </a:lnSpc>
-              <a:spcBef>
-                <a:spcPts val="375"/>
-              </a:spcBef>
-              <a:buFont typeface="Arial" panose="020B0604020202020204" pitchFamily="34" charset="0"/>
-              <a:buChar char="•"/>
-            </a:pPr>
-            <a:r>
-              <a:rPr lang="en-US" dirty="0"/>
-              <a:t>Bullet</a:t>
-            </a:r>
-          </a:p>
-          <a:p>
-            <a:pPr marL="345600" lvl="4" indent="-171450" algn="l" defTabSz="685800" rtl="0" eaLnBrk="1" latinLnBrk="0" hangingPunct="1">
-              <a:lnSpc>
-                <a:spcPct val="90000"/>
-              </a:lnSpc>
-              <a:spcBef>
-                <a:spcPts val="375"/>
-              </a:spcBef>
-              <a:buFont typeface="Arial" panose="020B0604020202020204" pitchFamily="34" charset="0"/>
-              <a:buChar char="•"/>
-            </a:pPr>
-            <a:r>
-              <a:rPr lang="en-US" dirty="0"/>
-              <a:t>Bullet sub</a:t>
-            </a:r>
-            <a:endParaRPr lang="en-GB" dirty="0"/>
-          </a:p>
-        </p:txBody>
-      </p:sp>
-      <p:sp>
-        <p:nvSpPr>
           <p:cNvPr id="5" name="Footer Placeholder 4">
             <a:extLst>
               <a:ext uri="{FF2B5EF4-FFF2-40B4-BE49-F238E27FC236}">
@@ -7313,6 +6909,244 @@
                 </a:prstClr>
               </a:solidFill>
             </a:endParaRPr>
+          </a:p>
+        </p:txBody>
+      </p:sp>
+      <p:sp>
+        <p:nvSpPr>
+          <p:cNvPr id="4" name="Content Placeholder 2">
+            <a:extLst>
+              <a:ext uri="{FF2B5EF4-FFF2-40B4-BE49-F238E27FC236}">
+                <a16:creationId xmlns:a16="http://schemas.microsoft.com/office/drawing/2014/main" id="{EBDF3556-2EB3-6357-B7D8-BEF9376CE238}"/>
+              </a:ext>
+            </a:extLst>
+          </p:cNvPr>
+          <p:cNvSpPr txBox="1">
+            <a:spLocks/>
+          </p:cNvSpPr>
+          <p:nvPr userDrawn="1"/>
+        </p:nvSpPr>
+        <p:spPr>
+          <a:xfrm>
+            <a:off x="270000" y="1080000"/>
+            <a:ext cx="8584622" cy="3263504"/>
+          </a:xfrm>
+          <a:prstGeom prst="rect">
+            <a:avLst/>
+          </a:prstGeom>
+        </p:spPr>
+        <p:txBody>
+          <a:bodyPr/>
+          <a:lstStyle>
+            <a:lvl1pPr marL="285750" indent="-285750" algn="l" defTabSz="685800" rtl="0" eaLnBrk="1" latinLnBrk="0" hangingPunct="1">
+              <a:lnSpc>
+                <a:spcPct val="90000"/>
+              </a:lnSpc>
+              <a:spcBef>
+                <a:spcPts val="0"/>
+              </a:spcBef>
+              <a:spcAft>
+                <a:spcPts val="900"/>
+              </a:spcAft>
+              <a:buFont typeface="Arial" panose="020B0604020202020204" pitchFamily="34" charset="0"/>
+              <a:buChar char="•"/>
+              <a:defRPr lang="en-US" sz="1575" b="0" kern="1200" dirty="0">
+                <a:solidFill>
+                  <a:schemeClr val="tx1"/>
+                </a:solidFill>
+                <a:latin typeface="+mn-lt"/>
+                <a:ea typeface="+mn-ea"/>
+                <a:cs typeface="+mn-cs"/>
+              </a:defRPr>
+            </a:lvl1pPr>
+            <a:lvl2pPr marL="171450" indent="-171450" algn="l" defTabSz="685800" rtl="0" eaLnBrk="1" latinLnBrk="0" hangingPunct="1">
+              <a:lnSpc>
+                <a:spcPct val="90000"/>
+              </a:lnSpc>
+              <a:spcBef>
+                <a:spcPts val="0"/>
+              </a:spcBef>
+              <a:spcAft>
+                <a:spcPts val="450"/>
+              </a:spcAft>
+              <a:buFont typeface="Arial" panose="020B0604020202020204" pitchFamily="34" charset="0"/>
+              <a:buChar char="•"/>
+              <a:defRPr lang="en-US" sz="1200" b="0" kern="1200" dirty="0">
+                <a:solidFill>
+                  <a:schemeClr val="tx1"/>
+                </a:solidFill>
+                <a:latin typeface="+mn-lt"/>
+                <a:ea typeface="+mn-ea"/>
+                <a:cs typeface="+mn-cs"/>
+              </a:defRPr>
+            </a:lvl2pPr>
+            <a:lvl3pPr marL="0" indent="0" algn="l" defTabSz="685800" rtl="0" eaLnBrk="1" latinLnBrk="0" hangingPunct="1">
+              <a:lnSpc>
+                <a:spcPct val="90000"/>
+              </a:lnSpc>
+              <a:spcBef>
+                <a:spcPts val="0"/>
+              </a:spcBef>
+              <a:spcAft>
+                <a:spcPts val="450"/>
+              </a:spcAft>
+              <a:buFont typeface="Arial" panose="020B0604020202020204" pitchFamily="34" charset="0"/>
+              <a:buNone/>
+              <a:defRPr lang="en-US" sz="1200" kern="1200" dirty="0">
+                <a:solidFill>
+                  <a:schemeClr val="tx1"/>
+                </a:solidFill>
+                <a:latin typeface="+mn-lt"/>
+                <a:ea typeface="+mn-ea"/>
+                <a:cs typeface="+mn-cs"/>
+              </a:defRPr>
+            </a:lvl3pPr>
+            <a:lvl4pPr marL="0" indent="-171450" algn="l" defTabSz="685800" rtl="0" eaLnBrk="1" latinLnBrk="0" hangingPunct="1">
+              <a:lnSpc>
+                <a:spcPct val="90000"/>
+              </a:lnSpc>
+              <a:spcBef>
+                <a:spcPts val="375"/>
+              </a:spcBef>
+              <a:buFont typeface="Arial" panose="020B0604020202020204" pitchFamily="34" charset="0"/>
+              <a:buChar char="•"/>
+              <a:defRPr lang="en-US" sz="1200" kern="1200" dirty="0">
+                <a:solidFill>
+                  <a:schemeClr val="tx1"/>
+                </a:solidFill>
+                <a:latin typeface="+mn-lt"/>
+                <a:ea typeface="+mn-ea"/>
+                <a:cs typeface="+mn-cs"/>
+              </a:defRPr>
+            </a:lvl4pPr>
+            <a:lvl5pPr marL="345600" indent="-171450" algn="l" defTabSz="685800" rtl="0" eaLnBrk="1" latinLnBrk="0" hangingPunct="1">
+              <a:lnSpc>
+                <a:spcPct val="90000"/>
+              </a:lnSpc>
+              <a:spcBef>
+                <a:spcPts val="375"/>
+              </a:spcBef>
+              <a:buFont typeface="Arial" panose="020B0604020202020204" pitchFamily="34" charset="0"/>
+              <a:buChar char="•"/>
+              <a:defRPr lang="en-GB" sz="1200" kern="1200" dirty="0">
+                <a:solidFill>
+                  <a:schemeClr val="tx1"/>
+                </a:solidFill>
+                <a:latin typeface="+mn-lt"/>
+                <a:ea typeface="+mn-ea"/>
+                <a:cs typeface="+mn-cs"/>
+              </a:defRPr>
+            </a:lvl5pPr>
+            <a:lvl6pPr marL="1885950" indent="-171450" algn="l" defTabSz="685800" rtl="0" eaLnBrk="1" latinLnBrk="0" hangingPunct="1">
+              <a:lnSpc>
+                <a:spcPct val="90000"/>
+              </a:lnSpc>
+              <a:spcBef>
+                <a:spcPts val="375"/>
+              </a:spcBef>
+              <a:buFont typeface="Arial" panose="020B0604020202020204" pitchFamily="34" charset="0"/>
+              <a:buChar char="•"/>
+              <a:defRPr sz="1350" kern="1200">
+                <a:solidFill>
+                  <a:schemeClr val="tx1"/>
+                </a:solidFill>
+                <a:latin typeface="+mn-lt"/>
+                <a:ea typeface="+mn-ea"/>
+                <a:cs typeface="+mn-cs"/>
+              </a:defRPr>
+            </a:lvl6pPr>
+            <a:lvl7pPr marL="2228850" indent="-171450" algn="l" defTabSz="685800" rtl="0" eaLnBrk="1" latinLnBrk="0" hangingPunct="1">
+              <a:lnSpc>
+                <a:spcPct val="90000"/>
+              </a:lnSpc>
+              <a:spcBef>
+                <a:spcPts val="375"/>
+              </a:spcBef>
+              <a:buFont typeface="Arial" panose="020B0604020202020204" pitchFamily="34" charset="0"/>
+              <a:buChar char="•"/>
+              <a:defRPr sz="1350" kern="1200">
+                <a:solidFill>
+                  <a:schemeClr val="tx1"/>
+                </a:solidFill>
+                <a:latin typeface="+mn-lt"/>
+                <a:ea typeface="+mn-ea"/>
+                <a:cs typeface="+mn-cs"/>
+              </a:defRPr>
+            </a:lvl7pPr>
+            <a:lvl8pPr marL="2571750" indent="-171450" algn="l" defTabSz="685800" rtl="0" eaLnBrk="1" latinLnBrk="0" hangingPunct="1">
+              <a:lnSpc>
+                <a:spcPct val="90000"/>
+              </a:lnSpc>
+              <a:spcBef>
+                <a:spcPts val="375"/>
+              </a:spcBef>
+              <a:buFont typeface="Arial" panose="020B0604020202020204" pitchFamily="34" charset="0"/>
+              <a:buChar char="•"/>
+              <a:defRPr sz="1350" kern="1200">
+                <a:solidFill>
+                  <a:schemeClr val="tx1"/>
+                </a:solidFill>
+                <a:latin typeface="+mn-lt"/>
+                <a:ea typeface="+mn-ea"/>
+                <a:cs typeface="+mn-cs"/>
+              </a:defRPr>
+            </a:lvl8pPr>
+            <a:lvl9pPr marL="2914650" indent="-171450" algn="l" defTabSz="685800" rtl="0" eaLnBrk="1" latinLnBrk="0" hangingPunct="1">
+              <a:lnSpc>
+                <a:spcPct val="90000"/>
+              </a:lnSpc>
+              <a:spcBef>
+                <a:spcPts val="375"/>
+              </a:spcBef>
+              <a:buFont typeface="Arial" panose="020B0604020202020204" pitchFamily="34" charset="0"/>
+              <a:buChar char="•"/>
+              <a:defRPr sz="1350" kern="1200">
+                <a:solidFill>
+                  <a:schemeClr val="tx1"/>
+                </a:solidFill>
+                <a:latin typeface="+mn-lt"/>
+                <a:ea typeface="+mn-ea"/>
+                <a:cs typeface="+mn-cs"/>
+              </a:defRPr>
+            </a:lvl9pPr>
+          </a:lstStyle>
+          <a:p>
+            <a:r>
+              <a:rPr lang="en-GB" dirty="0"/>
+              <a:t>Click to edit Master text styles</a:t>
+            </a:r>
+          </a:p>
+          <a:p>
+            <a:pPr lvl="1"/>
+            <a:r>
+              <a:rPr lang="en-GB" dirty="0"/>
+              <a:t>Second level</a:t>
+            </a:r>
+          </a:p>
+          <a:p>
+            <a:pPr lvl="4"/>
+            <a:r>
+              <a:rPr lang="en-GB" dirty="0"/>
+              <a:t>Third level</a:t>
+            </a:r>
+          </a:p>
+          <a:p>
+            <a:pPr lvl="4"/>
+            <a:r>
+              <a:rPr lang="en-GB" dirty="0"/>
+              <a:t>Fourth level</a:t>
+            </a:r>
+          </a:p>
+          <a:p>
+            <a:pPr lvl="4"/>
+            <a:r>
+              <a:rPr lang="en-GB" dirty="0"/>
+              <a:t>Fifth level</a:t>
+            </a:r>
+          </a:p>
+          <a:p>
+            <a:pPr lvl="1"/>
+            <a:endParaRPr lang="en-GB" dirty="0"/>
           </a:p>
         </p:txBody>
       </p:sp>

</xml_diff>

<commit_message>
Update PowerPoint templates to include page numbers
</commit_message>
<xml_diff>
--- a/_extensions/DHSC/DHSC-PPT-template.pptx
+++ b/_extensions/DHSC/DHSC-PPT-template.pptx
@@ -208,7 +208,7 @@
           <a:p>
             <a:fld id="{0F9C1CCF-B725-44A7-AA57-5E433BD85C9F}" type="datetimeFigureOut">
               <a:rPr lang="en-US" smtClean="0"/>
-              <a:t>8/30/2023</a:t>
+              <a:t>1/23/2024</a:t>
             </a:fld>
             <a:endParaRPr lang="en-US"/>
           </a:p>
@@ -684,11 +684,6 @@
             </a:lvl1pPr>
           </a:lstStyle>
           <a:p>
-            <a:fld id="{241EB5C9-1307-BA42-ABA2-0BC069CD8E7F}" type="datetimeFigureOut">
-              <a:rPr lang="en-US" smtClean="0"/>
-              <a:pPr/>
-              <a:t>8/30/2023</a:t>
-            </a:fld>
             <a:endParaRPr lang="en-US" dirty="0"/>
           </a:p>
         </p:txBody>
@@ -2378,7 +2373,6 @@
   <p:clrMapOvr>
     <a:masterClrMapping/>
   </p:clrMapOvr>
-  <p:hf sldNum="0" hdr="0" ftr="0" dt="0"/>
 </p:sldLayout>
 </file>
 
@@ -4201,7 +4195,6 @@
   <p:clrMapOvr>
     <a:masterClrMapping/>
   </p:clrMapOvr>
-  <p:hf sldNum="0" hdr="0" ftr="0" dt="0"/>
 </p:sldLayout>
 </file>
 
@@ -7179,6 +7172,7 @@
     <p:sldLayoutId id="2147483667" r:id="rId18"/>
     <p:sldLayoutId id="2147483668" r:id="rId19"/>
   </p:sldLayoutIdLst>
+  <p:hf hdr="0" ftr="0" dt="0"/>
   <p:txStyles>
     <p:titleStyle>
       <a:lvl1pPr algn="l" defTabSz="685800" rtl="0" eaLnBrk="1" latinLnBrk="0" hangingPunct="1">

</xml_diff>